<commit_message>
[master] fixed typos in lesson 4
</commit_message>
<xml_diff>
--- a/lab_04-hello-flutter/lab_04-hello_flutter.pptx
+++ b/lab_04-hello-flutter/lab_04-hello_flutter.pptx
@@ -58,7 +58,7 @@
     <p:sldId id="352" r:id="rId49"/>
     <p:sldId id="353" r:id="rId50"/>
     <p:sldId id="382" r:id="rId51"/>
-    <p:sldId id="303" r:id="rId52"/>
+    <p:sldId id="391" r:id="rId52"/>
     <p:sldId id="309" r:id="rId53"/>
   </p:sldIdLst>
   <p:sldSz cx="12192000" cy="6858000"/>
@@ -248,7 +248,7 @@
           <a:p>
             <a:fld id="{81C4B3FE-0320-8142-8396-5C3025C019EC}" type="datetimeFigureOut">
               <a:rPr lang="en-IT" smtClean="0"/>
-              <a:t>24/02/22</a:t>
+              <a:t>19/03/22</a:t>
             </a:fld>
             <a:endParaRPr lang="en-IT"/>
           </a:p>
@@ -5253,6 +5253,7 @@
     <p:sldLayoutId id="2147483649" r:id="rId3"/>
     <p:sldLayoutId id="2147483654" r:id="rId4"/>
   </p:sldLayoutIdLst>
+  <p:hf hdr="0" ftr="0" dt="0"/>
   <p:txStyles>
     <p:titleStyle>
       <a:lvl1pPr algn="ctr" defTabSz="914400" rtl="0" eaLnBrk="1" latinLnBrk="0" hangingPunct="1">
@@ -5871,6 +5872,35 @@
           </a:prstGeom>
         </p:spPr>
       </p:pic>
+      <p:sp>
+        <p:nvSpPr>
+          <p:cNvPr id="4" name="Slide Number Placeholder 3">
+            <a:extLst>
+              <a:ext uri="{FF2B5EF4-FFF2-40B4-BE49-F238E27FC236}">
+                <a16:creationId xmlns:a16="http://schemas.microsoft.com/office/drawing/2014/main" id="{6FC73EFD-6E40-2740-B6C0-BB8EAC5FD562}"/>
+              </a:ext>
+            </a:extLst>
+          </p:cNvPr>
+          <p:cNvSpPr>
+            <a:spLocks noGrp="1"/>
+          </p:cNvSpPr>
+          <p:nvPr>
+            <p:ph type="sldNum" sz="quarter" idx="12"/>
+          </p:nvPr>
+        </p:nvSpPr>
+        <p:spPr/>
+        <p:txBody>
+          <a:bodyPr/>
+          <a:lstStyle/>
+          <a:p>
+            <a:fld id="{31DE2C5B-556E-47B8-A792-024C2FCA4ACC}" type="slidenum">
+              <a:rPr lang="en-GB" smtClean="0"/>
+              <a:t>10</a:t>
+            </a:fld>
+            <a:endParaRPr lang="en-GB"/>
+          </a:p>
+        </p:txBody>
+      </p:sp>
     </p:spTree>
     <p:extLst>
       <p:ext uri="{BB962C8B-B14F-4D97-AF65-F5344CB8AC3E}">
@@ -6019,6 +6049,35 @@
           </a:p>
         </p:txBody>
       </p:sp>
+      <p:sp>
+        <p:nvSpPr>
+          <p:cNvPr id="4" name="Slide Number Placeholder 3">
+            <a:extLst>
+              <a:ext uri="{FF2B5EF4-FFF2-40B4-BE49-F238E27FC236}">
+                <a16:creationId xmlns:a16="http://schemas.microsoft.com/office/drawing/2014/main" id="{3E204235-725C-B443-9278-19A01252D2DD}"/>
+              </a:ext>
+            </a:extLst>
+          </p:cNvPr>
+          <p:cNvSpPr>
+            <a:spLocks noGrp="1"/>
+          </p:cNvSpPr>
+          <p:nvPr>
+            <p:ph type="sldNum" sz="quarter" idx="12"/>
+          </p:nvPr>
+        </p:nvSpPr>
+        <p:spPr/>
+        <p:txBody>
+          <a:bodyPr/>
+          <a:lstStyle/>
+          <a:p>
+            <a:fld id="{31DE2C5B-556E-47B8-A792-024C2FCA4ACC}" type="slidenum">
+              <a:rPr lang="en-GB" smtClean="0"/>
+              <a:t>11</a:t>
+            </a:fld>
+            <a:endParaRPr lang="en-GB"/>
+          </a:p>
+        </p:txBody>
+      </p:sp>
     </p:spTree>
     <p:extLst>
       <p:ext uri="{BB962C8B-B14F-4D97-AF65-F5344CB8AC3E}">
@@ -6112,6 +6171,35 @@
           </a:p>
         </p:txBody>
       </p:sp>
+      <p:sp>
+        <p:nvSpPr>
+          <p:cNvPr id="4" name="Slide Number Placeholder 3">
+            <a:extLst>
+              <a:ext uri="{FF2B5EF4-FFF2-40B4-BE49-F238E27FC236}">
+                <a16:creationId xmlns:a16="http://schemas.microsoft.com/office/drawing/2014/main" id="{30C41296-A6A1-744D-A572-59F4B3ED7333}"/>
+              </a:ext>
+            </a:extLst>
+          </p:cNvPr>
+          <p:cNvSpPr>
+            <a:spLocks noGrp="1"/>
+          </p:cNvSpPr>
+          <p:nvPr>
+            <p:ph type="sldNum" sz="quarter" idx="12"/>
+          </p:nvPr>
+        </p:nvSpPr>
+        <p:spPr/>
+        <p:txBody>
+          <a:bodyPr/>
+          <a:lstStyle/>
+          <a:p>
+            <a:fld id="{31DE2C5B-556E-47B8-A792-024C2FCA4ACC}" type="slidenum">
+              <a:rPr lang="en-GB" smtClean="0"/>
+              <a:t>12</a:t>
+            </a:fld>
+            <a:endParaRPr lang="en-GB"/>
+          </a:p>
+        </p:txBody>
+      </p:sp>
     </p:spTree>
     <p:extLst>
       <p:ext uri="{BB962C8B-B14F-4D97-AF65-F5344CB8AC3E}">
@@ -6351,6 +6439,35 @@
           </a:prstGeom>
         </p:spPr>
       </p:pic>
+      <p:sp>
+        <p:nvSpPr>
+          <p:cNvPr id="4" name="Slide Number Placeholder 3">
+            <a:extLst>
+              <a:ext uri="{FF2B5EF4-FFF2-40B4-BE49-F238E27FC236}">
+                <a16:creationId xmlns:a16="http://schemas.microsoft.com/office/drawing/2014/main" id="{8568C660-DCF4-A140-972E-EC6CD590CD7F}"/>
+              </a:ext>
+            </a:extLst>
+          </p:cNvPr>
+          <p:cNvSpPr>
+            <a:spLocks noGrp="1"/>
+          </p:cNvSpPr>
+          <p:nvPr>
+            <p:ph type="sldNum" sz="quarter" idx="12"/>
+          </p:nvPr>
+        </p:nvSpPr>
+        <p:spPr/>
+        <p:txBody>
+          <a:bodyPr/>
+          <a:lstStyle/>
+          <a:p>
+            <a:fld id="{31DE2C5B-556E-47B8-A792-024C2FCA4ACC}" type="slidenum">
+              <a:rPr lang="en-GB" smtClean="0"/>
+              <a:t>13</a:t>
+            </a:fld>
+            <a:endParaRPr lang="en-GB"/>
+          </a:p>
+        </p:txBody>
+      </p:sp>
     </p:spTree>
     <p:extLst>
       <p:ext uri="{BB962C8B-B14F-4D97-AF65-F5344CB8AC3E}">
@@ -6986,6 +7103,35 @@
           </a:p>
         </p:txBody>
       </p:sp>
+      <p:sp>
+        <p:nvSpPr>
+          <p:cNvPr id="4" name="Slide Number Placeholder 3">
+            <a:extLst>
+              <a:ext uri="{FF2B5EF4-FFF2-40B4-BE49-F238E27FC236}">
+                <a16:creationId xmlns:a16="http://schemas.microsoft.com/office/drawing/2014/main" id="{64FC2BEA-78DF-E04C-97E7-52B63C111945}"/>
+              </a:ext>
+            </a:extLst>
+          </p:cNvPr>
+          <p:cNvSpPr>
+            <a:spLocks noGrp="1"/>
+          </p:cNvSpPr>
+          <p:nvPr>
+            <p:ph type="sldNum" sz="quarter" idx="12"/>
+          </p:nvPr>
+        </p:nvSpPr>
+        <p:spPr/>
+        <p:txBody>
+          <a:bodyPr/>
+          <a:lstStyle/>
+          <a:p>
+            <a:fld id="{31DE2C5B-556E-47B8-A792-024C2FCA4ACC}" type="slidenum">
+              <a:rPr lang="en-GB" smtClean="0"/>
+              <a:t>14</a:t>
+            </a:fld>
+            <a:endParaRPr lang="en-GB"/>
+          </a:p>
+        </p:txBody>
+      </p:sp>
     </p:spTree>
     <p:extLst>
       <p:ext uri="{BB962C8B-B14F-4D97-AF65-F5344CB8AC3E}">
@@ -7207,6 +7353,35 @@
           </a:extLst>
         </p:spPr>
       </p:pic>
+      <p:sp>
+        <p:nvSpPr>
+          <p:cNvPr id="4" name="Slide Number Placeholder 3">
+            <a:extLst>
+              <a:ext uri="{FF2B5EF4-FFF2-40B4-BE49-F238E27FC236}">
+                <a16:creationId xmlns:a16="http://schemas.microsoft.com/office/drawing/2014/main" id="{A69435CD-DAF8-CF43-B7BF-69FF9F8276F3}"/>
+              </a:ext>
+            </a:extLst>
+          </p:cNvPr>
+          <p:cNvSpPr>
+            <a:spLocks noGrp="1"/>
+          </p:cNvSpPr>
+          <p:nvPr>
+            <p:ph type="sldNum" sz="quarter" idx="12"/>
+          </p:nvPr>
+        </p:nvSpPr>
+        <p:spPr/>
+        <p:txBody>
+          <a:bodyPr/>
+          <a:lstStyle/>
+          <a:p>
+            <a:fld id="{31DE2C5B-556E-47B8-A792-024C2FCA4ACC}" type="slidenum">
+              <a:rPr lang="en-GB" smtClean="0"/>
+              <a:t>15</a:t>
+            </a:fld>
+            <a:endParaRPr lang="en-GB"/>
+          </a:p>
+        </p:txBody>
+      </p:sp>
     </p:spTree>
     <p:extLst>
       <p:ext uri="{BB962C8B-B14F-4D97-AF65-F5344CB8AC3E}">
@@ -7854,6 +8029,35 @@
           </a:fontRef>
         </p:style>
       </p:cxnSp>
+      <p:sp>
+        <p:nvSpPr>
+          <p:cNvPr id="4" name="Slide Number Placeholder 3">
+            <a:extLst>
+              <a:ext uri="{FF2B5EF4-FFF2-40B4-BE49-F238E27FC236}">
+                <a16:creationId xmlns:a16="http://schemas.microsoft.com/office/drawing/2014/main" id="{6412F6FB-2F89-4942-9D7F-06E76D300BBD}"/>
+              </a:ext>
+            </a:extLst>
+          </p:cNvPr>
+          <p:cNvSpPr>
+            <a:spLocks noGrp="1"/>
+          </p:cNvSpPr>
+          <p:nvPr>
+            <p:ph type="sldNum" sz="quarter" idx="12"/>
+          </p:nvPr>
+        </p:nvSpPr>
+        <p:spPr/>
+        <p:txBody>
+          <a:bodyPr/>
+          <a:lstStyle/>
+          <a:p>
+            <a:fld id="{31DE2C5B-556E-47B8-A792-024C2FCA4ACC}" type="slidenum">
+              <a:rPr lang="en-GB" smtClean="0"/>
+              <a:t>16</a:t>
+            </a:fld>
+            <a:endParaRPr lang="en-GB"/>
+          </a:p>
+        </p:txBody>
+      </p:sp>
     </p:spTree>
     <p:extLst>
       <p:ext uri="{BB962C8B-B14F-4D97-AF65-F5344CB8AC3E}">
@@ -9078,6 +9282,35 @@
           </a:fontRef>
         </p:style>
       </p:cxnSp>
+      <p:sp>
+        <p:nvSpPr>
+          <p:cNvPr id="4" name="Slide Number Placeholder 3">
+            <a:extLst>
+              <a:ext uri="{FF2B5EF4-FFF2-40B4-BE49-F238E27FC236}">
+                <a16:creationId xmlns:a16="http://schemas.microsoft.com/office/drawing/2014/main" id="{585C4AA3-85B8-0A4C-B65C-9FE2BF607658}"/>
+              </a:ext>
+            </a:extLst>
+          </p:cNvPr>
+          <p:cNvSpPr>
+            <a:spLocks noGrp="1"/>
+          </p:cNvSpPr>
+          <p:nvPr>
+            <p:ph type="sldNum" sz="quarter" idx="12"/>
+          </p:nvPr>
+        </p:nvSpPr>
+        <p:spPr/>
+        <p:txBody>
+          <a:bodyPr/>
+          <a:lstStyle/>
+          <a:p>
+            <a:fld id="{31DE2C5B-556E-47B8-A792-024C2FCA4ACC}" type="slidenum">
+              <a:rPr lang="en-GB" smtClean="0"/>
+              <a:t>17</a:t>
+            </a:fld>
+            <a:endParaRPr lang="en-GB"/>
+          </a:p>
+        </p:txBody>
+      </p:sp>
     </p:spTree>
     <p:extLst>
       <p:ext uri="{BB962C8B-B14F-4D97-AF65-F5344CB8AC3E}">
@@ -9683,6 +9916,35 @@
           </a:p>
         </p:txBody>
       </p:sp>
+      <p:sp>
+        <p:nvSpPr>
+          <p:cNvPr id="4" name="Slide Number Placeholder 3">
+            <a:extLst>
+              <a:ext uri="{FF2B5EF4-FFF2-40B4-BE49-F238E27FC236}">
+                <a16:creationId xmlns:a16="http://schemas.microsoft.com/office/drawing/2014/main" id="{125389C0-C0D0-8F4C-A706-6CA276A87338}"/>
+              </a:ext>
+            </a:extLst>
+          </p:cNvPr>
+          <p:cNvSpPr>
+            <a:spLocks noGrp="1"/>
+          </p:cNvSpPr>
+          <p:nvPr>
+            <p:ph type="sldNum" sz="quarter" idx="12"/>
+          </p:nvPr>
+        </p:nvSpPr>
+        <p:spPr/>
+        <p:txBody>
+          <a:bodyPr/>
+          <a:lstStyle/>
+          <a:p>
+            <a:fld id="{31DE2C5B-556E-47B8-A792-024C2FCA4ACC}" type="slidenum">
+              <a:rPr lang="en-GB" smtClean="0"/>
+              <a:t>18</a:t>
+            </a:fld>
+            <a:endParaRPr lang="en-GB"/>
+          </a:p>
+        </p:txBody>
+      </p:sp>
     </p:spTree>
     <p:extLst>
       <p:ext uri="{BB962C8B-B14F-4D97-AF65-F5344CB8AC3E}">
@@ -9815,6 +10077,35 @@
           </a:p>
         </p:txBody>
       </p:sp>
+      <p:sp>
+        <p:nvSpPr>
+          <p:cNvPr id="4" name="Slide Number Placeholder 3">
+            <a:extLst>
+              <a:ext uri="{FF2B5EF4-FFF2-40B4-BE49-F238E27FC236}">
+                <a16:creationId xmlns:a16="http://schemas.microsoft.com/office/drawing/2014/main" id="{21757DFA-38F2-7E49-A670-0B55AA36C607}"/>
+              </a:ext>
+            </a:extLst>
+          </p:cNvPr>
+          <p:cNvSpPr>
+            <a:spLocks noGrp="1"/>
+          </p:cNvSpPr>
+          <p:nvPr>
+            <p:ph type="sldNum" sz="quarter" idx="12"/>
+          </p:nvPr>
+        </p:nvSpPr>
+        <p:spPr/>
+        <p:txBody>
+          <a:bodyPr/>
+          <a:lstStyle/>
+          <a:p>
+            <a:fld id="{31DE2C5B-556E-47B8-A792-024C2FCA4ACC}" type="slidenum">
+              <a:rPr lang="en-GB" smtClean="0"/>
+              <a:t>19</a:t>
+            </a:fld>
+            <a:endParaRPr lang="en-GB"/>
+          </a:p>
+        </p:txBody>
+      </p:sp>
     </p:spTree>
     <p:extLst>
       <p:ext uri="{BB962C8B-B14F-4D97-AF65-F5344CB8AC3E}">
@@ -9960,6 +10251,35 @@
               </a:rPr>
               <a:t>Homework &amp; Resources</a:t>
             </a:r>
+          </a:p>
+        </p:txBody>
+      </p:sp>
+      <p:sp>
+        <p:nvSpPr>
+          <p:cNvPr id="4" name="Slide Number Placeholder 3">
+            <a:extLst>
+              <a:ext uri="{FF2B5EF4-FFF2-40B4-BE49-F238E27FC236}">
+                <a16:creationId xmlns:a16="http://schemas.microsoft.com/office/drawing/2014/main" id="{C2280F60-35B4-6F45-9B78-E226153C93DB}"/>
+              </a:ext>
+            </a:extLst>
+          </p:cNvPr>
+          <p:cNvSpPr>
+            <a:spLocks noGrp="1"/>
+          </p:cNvSpPr>
+          <p:nvPr>
+            <p:ph type="sldNum" sz="quarter" idx="12"/>
+          </p:nvPr>
+        </p:nvSpPr>
+        <p:spPr/>
+        <p:txBody>
+          <a:bodyPr/>
+          <a:lstStyle/>
+          <a:p>
+            <a:fld id="{31DE2C5B-556E-47B8-A792-024C2FCA4ACC}" type="slidenum">
+              <a:rPr lang="en-GB" smtClean="0"/>
+              <a:t>2</a:t>
+            </a:fld>
+            <a:endParaRPr lang="en-GB"/>
           </a:p>
         </p:txBody>
       </p:sp>
@@ -10991,6 +11311,35 @@
           </a:p>
         </p:txBody>
       </p:sp>
+      <p:sp>
+        <p:nvSpPr>
+          <p:cNvPr id="5" name="Slide Number Placeholder 4">
+            <a:extLst>
+              <a:ext uri="{FF2B5EF4-FFF2-40B4-BE49-F238E27FC236}">
+                <a16:creationId xmlns:a16="http://schemas.microsoft.com/office/drawing/2014/main" id="{0C2B6D0C-2695-7642-86BC-893D64AE9B13}"/>
+              </a:ext>
+            </a:extLst>
+          </p:cNvPr>
+          <p:cNvSpPr>
+            <a:spLocks noGrp="1"/>
+          </p:cNvSpPr>
+          <p:nvPr>
+            <p:ph type="sldNum" sz="quarter" idx="12"/>
+          </p:nvPr>
+        </p:nvSpPr>
+        <p:spPr/>
+        <p:txBody>
+          <a:bodyPr/>
+          <a:lstStyle/>
+          <a:p>
+            <a:fld id="{31DE2C5B-556E-47B8-A792-024C2FCA4ACC}" type="slidenum">
+              <a:rPr lang="en-GB" smtClean="0"/>
+              <a:t>20</a:t>
+            </a:fld>
+            <a:endParaRPr lang="en-GB"/>
+          </a:p>
+        </p:txBody>
+      </p:sp>
     </p:spTree>
     <p:extLst>
       <p:ext uri="{BB962C8B-B14F-4D97-AF65-F5344CB8AC3E}">
@@ -11302,6 +11651,35 @@
           </a:p>
         </p:txBody>
       </p:sp>
+      <p:sp>
+        <p:nvSpPr>
+          <p:cNvPr id="3" name="Slide Number Placeholder 2">
+            <a:extLst>
+              <a:ext uri="{FF2B5EF4-FFF2-40B4-BE49-F238E27FC236}">
+                <a16:creationId xmlns:a16="http://schemas.microsoft.com/office/drawing/2014/main" id="{C366A519-F0E4-434A-B4AA-F28527A3A423}"/>
+              </a:ext>
+            </a:extLst>
+          </p:cNvPr>
+          <p:cNvSpPr>
+            <a:spLocks noGrp="1"/>
+          </p:cNvSpPr>
+          <p:nvPr>
+            <p:ph type="sldNum" sz="quarter" idx="12"/>
+          </p:nvPr>
+        </p:nvSpPr>
+        <p:spPr/>
+        <p:txBody>
+          <a:bodyPr/>
+          <a:lstStyle/>
+          <a:p>
+            <a:fld id="{31DE2C5B-556E-47B8-A792-024C2FCA4ACC}" type="slidenum">
+              <a:rPr lang="en-GB" smtClean="0"/>
+              <a:t>21</a:t>
+            </a:fld>
+            <a:endParaRPr lang="en-GB"/>
+          </a:p>
+        </p:txBody>
+      </p:sp>
     </p:spTree>
     <p:extLst>
       <p:ext uri="{BB962C8B-B14F-4D97-AF65-F5344CB8AC3E}">
@@ -12195,6 +12573,35 @@
           </a:prstGeom>
         </p:spPr>
       </p:pic>
+      <p:sp>
+        <p:nvSpPr>
+          <p:cNvPr id="3" name="Slide Number Placeholder 2">
+            <a:extLst>
+              <a:ext uri="{FF2B5EF4-FFF2-40B4-BE49-F238E27FC236}">
+                <a16:creationId xmlns:a16="http://schemas.microsoft.com/office/drawing/2014/main" id="{FF006934-D9A4-4141-BECE-B1014BF5725E}"/>
+              </a:ext>
+            </a:extLst>
+          </p:cNvPr>
+          <p:cNvSpPr>
+            <a:spLocks noGrp="1"/>
+          </p:cNvSpPr>
+          <p:nvPr>
+            <p:ph type="sldNum" sz="quarter" idx="12"/>
+          </p:nvPr>
+        </p:nvSpPr>
+        <p:spPr/>
+        <p:txBody>
+          <a:bodyPr/>
+          <a:lstStyle/>
+          <a:p>
+            <a:fld id="{31DE2C5B-556E-47B8-A792-024C2FCA4ACC}" type="slidenum">
+              <a:rPr lang="en-GB" smtClean="0"/>
+              <a:t>22</a:t>
+            </a:fld>
+            <a:endParaRPr lang="en-GB"/>
+          </a:p>
+        </p:txBody>
+      </p:sp>
     </p:spTree>
     <p:extLst>
       <p:ext uri="{BB962C8B-B14F-4D97-AF65-F5344CB8AC3E}">
@@ -12343,6 +12750,35 @@
           </a:p>
         </p:txBody>
       </p:sp>
+      <p:sp>
+        <p:nvSpPr>
+          <p:cNvPr id="4" name="Slide Number Placeholder 3">
+            <a:extLst>
+              <a:ext uri="{FF2B5EF4-FFF2-40B4-BE49-F238E27FC236}">
+                <a16:creationId xmlns:a16="http://schemas.microsoft.com/office/drawing/2014/main" id="{99335BF9-DF72-1D4E-AC4F-76601C7E12EC}"/>
+              </a:ext>
+            </a:extLst>
+          </p:cNvPr>
+          <p:cNvSpPr>
+            <a:spLocks noGrp="1"/>
+          </p:cNvSpPr>
+          <p:nvPr>
+            <p:ph type="sldNum" sz="quarter" idx="12"/>
+          </p:nvPr>
+        </p:nvSpPr>
+        <p:spPr/>
+        <p:txBody>
+          <a:bodyPr/>
+          <a:lstStyle/>
+          <a:p>
+            <a:fld id="{31DE2C5B-556E-47B8-A792-024C2FCA4ACC}" type="slidenum">
+              <a:rPr lang="en-GB" smtClean="0"/>
+              <a:t>23</a:t>
+            </a:fld>
+            <a:endParaRPr lang="en-GB"/>
+          </a:p>
+        </p:txBody>
+      </p:sp>
     </p:spTree>
     <p:extLst>
       <p:ext uri="{BB962C8B-B14F-4D97-AF65-F5344CB8AC3E}">
@@ -12443,83 +12879,98 @@
             </a:r>
           </a:p>
           <a:p>
-            <a:endParaRPr lang="en-US" dirty="0"/>
-          </a:p>
-          <a:p>
-            <a:r>
-              <a:rPr lang="en-US" dirty="0"/>
-              <a:t>Aim: change </a:t>
-            </a:r>
-            <a:r>
-              <a:rPr lang="en-US" dirty="0" err="1"/>
-              <a:t>my_first_app</a:t>
-            </a:r>
-            <a:r>
-              <a:rPr lang="en-US" dirty="0"/>
-              <a:t> to this</a:t>
-            </a:r>
-          </a:p>
-          <a:p>
-            <a:endParaRPr lang="en-US" dirty="0"/>
-          </a:p>
-          <a:p>
-            <a:r>
-              <a:rPr lang="en-US" dirty="0"/>
-              <a:t>We will learn how to:</a:t>
-            </a:r>
-          </a:p>
-          <a:p>
-            <a:endParaRPr lang="en-US" dirty="0"/>
-          </a:p>
-          <a:p>
-            <a:pPr lvl="1"/>
-            <a:r>
-              <a:rPr lang="en-US" dirty="0"/>
-              <a:t>Install an external package and add it as a dependency</a:t>
-            </a:r>
-          </a:p>
-          <a:p>
-            <a:pPr lvl="1"/>
-            <a:endParaRPr lang="en-US" dirty="0"/>
-          </a:p>
-          <a:p>
-            <a:pPr lvl="1"/>
-            <a:r>
-              <a:rPr lang="en-US" dirty="0"/>
-              <a:t>Use the external package inside our app</a:t>
-            </a:r>
-          </a:p>
-          <a:p>
-            <a:pPr lvl="1"/>
-            <a:endParaRPr lang="en-US" dirty="0"/>
-          </a:p>
-          <a:p>
-            <a:pPr lvl="1"/>
-            <a:r>
-              <a:rPr lang="en-US" dirty="0" err="1"/>
-              <a:t>StatefulWidgets</a:t>
-            </a:r>
-            <a:r>
-              <a:rPr lang="en-US" dirty="0"/>
-              <a:t> 101</a:t>
-            </a:r>
-          </a:p>
-          <a:p>
-            <a:pPr lvl="1"/>
-            <a:endParaRPr lang="en-US" dirty="0"/>
-          </a:p>
-          <a:p>
-            <a:pPr lvl="1"/>
-            <a:r>
-              <a:rPr lang="en-US" dirty="0"/>
-              <a:t>How to modify the UI </a:t>
-            </a:r>
-          </a:p>
-          <a:p>
             <a:pPr marL="0" indent="0">
               <a:buNone/>
             </a:pPr>
             <a:endParaRPr lang="en-US" dirty="0"/>
+          </a:p>
+          <a:p>
+            <a:r>
+              <a:rPr lang="en-US" dirty="0"/>
+              <a:t>We will learn how to:</a:t>
+            </a:r>
+          </a:p>
+          <a:p>
+            <a:endParaRPr lang="en-US" dirty="0"/>
+          </a:p>
+          <a:p>
+            <a:pPr lvl="1"/>
+            <a:r>
+              <a:rPr lang="en-US" dirty="0"/>
+              <a:t>Install an external package and add it as a dependency</a:t>
+            </a:r>
+          </a:p>
+          <a:p>
+            <a:pPr lvl="1"/>
+            <a:endParaRPr lang="en-US" dirty="0"/>
+          </a:p>
+          <a:p>
+            <a:pPr lvl="1"/>
+            <a:r>
+              <a:rPr lang="en-US" dirty="0"/>
+              <a:t>Use the external package inside our app</a:t>
+            </a:r>
+          </a:p>
+          <a:p>
+            <a:pPr lvl="1"/>
+            <a:endParaRPr lang="en-US" dirty="0"/>
+          </a:p>
+          <a:p>
+            <a:pPr lvl="1"/>
+            <a:r>
+              <a:rPr lang="en-US" dirty="0" err="1"/>
+              <a:t>StatefulWidgets</a:t>
+            </a:r>
+            <a:r>
+              <a:rPr lang="en-US" dirty="0"/>
+              <a:t> 101</a:t>
+            </a:r>
+          </a:p>
+          <a:p>
+            <a:pPr lvl="1"/>
+            <a:endParaRPr lang="en-US" dirty="0"/>
+          </a:p>
+          <a:p>
+            <a:pPr lvl="1"/>
+            <a:r>
+              <a:rPr lang="en-US" dirty="0"/>
+              <a:t>How to modify the UI </a:t>
+            </a:r>
+          </a:p>
+          <a:p>
+            <a:pPr marL="0" indent="0">
+              <a:buNone/>
+            </a:pPr>
+            <a:endParaRPr lang="en-US" dirty="0"/>
+          </a:p>
+        </p:txBody>
+      </p:sp>
+      <p:sp>
+        <p:nvSpPr>
+          <p:cNvPr id="4" name="Slide Number Placeholder 3">
+            <a:extLst>
+              <a:ext uri="{FF2B5EF4-FFF2-40B4-BE49-F238E27FC236}">
+                <a16:creationId xmlns:a16="http://schemas.microsoft.com/office/drawing/2014/main" id="{C947AD76-B7B9-164C-A707-48324082621E}"/>
+              </a:ext>
+            </a:extLst>
+          </p:cNvPr>
+          <p:cNvSpPr>
+            <a:spLocks noGrp="1"/>
+          </p:cNvSpPr>
+          <p:nvPr>
+            <p:ph type="sldNum" sz="quarter" idx="12"/>
+          </p:nvPr>
+        </p:nvSpPr>
+        <p:spPr/>
+        <p:txBody>
+          <a:bodyPr/>
+          <a:lstStyle/>
+          <a:p>
+            <a:fld id="{31DE2C5B-556E-47B8-A792-024C2FCA4ACC}" type="slidenum">
+              <a:rPr lang="en-GB" smtClean="0"/>
+              <a:t>24</a:t>
+            </a:fld>
+            <a:endParaRPr lang="en-GB"/>
           </a:p>
         </p:txBody>
       </p:sp>
@@ -12662,6 +13113,35 @@
           </a:prstGeom>
         </p:spPr>
       </p:pic>
+      <p:sp>
+        <p:nvSpPr>
+          <p:cNvPr id="5" name="Slide Number Placeholder 4">
+            <a:extLst>
+              <a:ext uri="{FF2B5EF4-FFF2-40B4-BE49-F238E27FC236}">
+                <a16:creationId xmlns:a16="http://schemas.microsoft.com/office/drawing/2014/main" id="{4F4C5C5B-B3AF-4148-B826-F40940F6DEED}"/>
+              </a:ext>
+            </a:extLst>
+          </p:cNvPr>
+          <p:cNvSpPr>
+            <a:spLocks noGrp="1"/>
+          </p:cNvSpPr>
+          <p:nvPr>
+            <p:ph type="sldNum" sz="quarter" idx="12"/>
+          </p:nvPr>
+        </p:nvSpPr>
+        <p:spPr/>
+        <p:txBody>
+          <a:bodyPr/>
+          <a:lstStyle/>
+          <a:p>
+            <a:fld id="{31DE2C5B-556E-47B8-A792-024C2FCA4ACC}" type="slidenum">
+              <a:rPr lang="en-GB" smtClean="0"/>
+              <a:t>25</a:t>
+            </a:fld>
+            <a:endParaRPr lang="en-GB"/>
+          </a:p>
+        </p:txBody>
+      </p:sp>
     </p:spTree>
     <p:extLst>
       <p:ext uri="{BB962C8B-B14F-4D97-AF65-F5344CB8AC3E}">
@@ -12823,6 +13303,35 @@
           </a:p>
         </p:txBody>
       </p:sp>
+      <p:sp>
+        <p:nvSpPr>
+          <p:cNvPr id="4" name="Slide Number Placeholder 3">
+            <a:extLst>
+              <a:ext uri="{FF2B5EF4-FFF2-40B4-BE49-F238E27FC236}">
+                <a16:creationId xmlns:a16="http://schemas.microsoft.com/office/drawing/2014/main" id="{8FDDA74F-A7E3-BC44-8BC1-2D0089A4F8BD}"/>
+              </a:ext>
+            </a:extLst>
+          </p:cNvPr>
+          <p:cNvSpPr>
+            <a:spLocks noGrp="1"/>
+          </p:cNvSpPr>
+          <p:nvPr>
+            <p:ph type="sldNum" sz="quarter" idx="12"/>
+          </p:nvPr>
+        </p:nvSpPr>
+        <p:spPr/>
+        <p:txBody>
+          <a:bodyPr/>
+          <a:lstStyle/>
+          <a:p>
+            <a:fld id="{31DE2C5B-556E-47B8-A792-024C2FCA4ACC}" type="slidenum">
+              <a:rPr lang="en-GB" smtClean="0"/>
+              <a:t>26</a:t>
+            </a:fld>
+            <a:endParaRPr lang="en-GB"/>
+          </a:p>
+        </p:txBody>
+      </p:sp>
     </p:spTree>
     <p:extLst>
       <p:ext uri="{BB962C8B-B14F-4D97-AF65-F5344CB8AC3E}">
@@ -12978,6 +13487,35 @@
           </a:prstGeom>
         </p:spPr>
       </p:pic>
+      <p:sp>
+        <p:nvSpPr>
+          <p:cNvPr id="4" name="Slide Number Placeholder 3">
+            <a:extLst>
+              <a:ext uri="{FF2B5EF4-FFF2-40B4-BE49-F238E27FC236}">
+                <a16:creationId xmlns:a16="http://schemas.microsoft.com/office/drawing/2014/main" id="{C77EC9CF-F371-DE40-8D5D-80FE0031E145}"/>
+              </a:ext>
+            </a:extLst>
+          </p:cNvPr>
+          <p:cNvSpPr>
+            <a:spLocks noGrp="1"/>
+          </p:cNvSpPr>
+          <p:nvPr>
+            <p:ph type="sldNum" sz="quarter" idx="12"/>
+          </p:nvPr>
+        </p:nvSpPr>
+        <p:spPr/>
+        <p:txBody>
+          <a:bodyPr/>
+          <a:lstStyle/>
+          <a:p>
+            <a:fld id="{31DE2C5B-556E-47B8-A792-024C2FCA4ACC}" type="slidenum">
+              <a:rPr lang="en-GB" smtClean="0"/>
+              <a:t>27</a:t>
+            </a:fld>
+            <a:endParaRPr lang="en-GB"/>
+          </a:p>
+        </p:txBody>
+      </p:sp>
     </p:spTree>
     <p:extLst>
       <p:ext uri="{BB962C8B-B14F-4D97-AF65-F5344CB8AC3E}">
@@ -13304,6 +13842,35 @@
           </a:fontRef>
         </p:style>
       </p:cxnSp>
+      <p:sp>
+        <p:nvSpPr>
+          <p:cNvPr id="4" name="Slide Number Placeholder 3">
+            <a:extLst>
+              <a:ext uri="{FF2B5EF4-FFF2-40B4-BE49-F238E27FC236}">
+                <a16:creationId xmlns:a16="http://schemas.microsoft.com/office/drawing/2014/main" id="{55B498D7-F4D5-8A49-A525-80FAFB97EA01}"/>
+              </a:ext>
+            </a:extLst>
+          </p:cNvPr>
+          <p:cNvSpPr>
+            <a:spLocks noGrp="1"/>
+          </p:cNvSpPr>
+          <p:nvPr>
+            <p:ph type="sldNum" sz="quarter" idx="12"/>
+          </p:nvPr>
+        </p:nvSpPr>
+        <p:spPr/>
+        <p:txBody>
+          <a:bodyPr/>
+          <a:lstStyle/>
+          <a:p>
+            <a:fld id="{31DE2C5B-556E-47B8-A792-024C2FCA4ACC}" type="slidenum">
+              <a:rPr lang="en-GB" smtClean="0"/>
+              <a:t>28</a:t>
+            </a:fld>
+            <a:endParaRPr lang="en-GB"/>
+          </a:p>
+        </p:txBody>
+      </p:sp>
     </p:spTree>
     <p:extLst>
       <p:ext uri="{BB962C8B-B14F-4D97-AF65-F5344CB8AC3E}">
@@ -13618,6 +14185,35 @@
               </a:rPr>
               <a:t> </a:t>
             </a:r>
+          </a:p>
+        </p:txBody>
+      </p:sp>
+      <p:sp>
+        <p:nvSpPr>
+          <p:cNvPr id="5" name="Slide Number Placeholder 4">
+            <a:extLst>
+              <a:ext uri="{FF2B5EF4-FFF2-40B4-BE49-F238E27FC236}">
+                <a16:creationId xmlns:a16="http://schemas.microsoft.com/office/drawing/2014/main" id="{7558910B-7AF5-B142-A44E-03FA100095DB}"/>
+              </a:ext>
+            </a:extLst>
+          </p:cNvPr>
+          <p:cNvSpPr>
+            <a:spLocks noGrp="1"/>
+          </p:cNvSpPr>
+          <p:nvPr>
+            <p:ph type="sldNum" sz="quarter" idx="12"/>
+          </p:nvPr>
+        </p:nvSpPr>
+        <p:spPr/>
+        <p:txBody>
+          <a:bodyPr/>
+          <a:lstStyle/>
+          <a:p>
+            <a:fld id="{31DE2C5B-556E-47B8-A792-024C2FCA4ACC}" type="slidenum">
+              <a:rPr lang="en-GB" smtClean="0"/>
+              <a:t>29</a:t>
+            </a:fld>
+            <a:endParaRPr lang="en-GB"/>
           </a:p>
         </p:txBody>
       </p:sp>
@@ -15800,6 +16396,35 @@
           </a:prstGeom>
         </p:spPr>
       </p:pic>
+      <p:sp>
+        <p:nvSpPr>
+          <p:cNvPr id="3" name="Slide Number Placeholder 2">
+            <a:extLst>
+              <a:ext uri="{FF2B5EF4-FFF2-40B4-BE49-F238E27FC236}">
+                <a16:creationId xmlns:a16="http://schemas.microsoft.com/office/drawing/2014/main" id="{94C64A00-177C-A044-BA7F-0FD1E0BA7547}"/>
+              </a:ext>
+            </a:extLst>
+          </p:cNvPr>
+          <p:cNvSpPr>
+            <a:spLocks noGrp="1"/>
+          </p:cNvSpPr>
+          <p:nvPr>
+            <p:ph type="sldNum" sz="quarter" idx="12"/>
+          </p:nvPr>
+        </p:nvSpPr>
+        <p:spPr/>
+        <p:txBody>
+          <a:bodyPr/>
+          <a:lstStyle/>
+          <a:p>
+            <a:fld id="{31DE2C5B-556E-47B8-A792-024C2FCA4ACC}" type="slidenum">
+              <a:rPr lang="en-GB" smtClean="0"/>
+              <a:t>3</a:t>
+            </a:fld>
+            <a:endParaRPr lang="en-GB"/>
+          </a:p>
+        </p:txBody>
+      </p:sp>
     </p:spTree>
     <p:extLst>
       <p:ext uri="{BB962C8B-B14F-4D97-AF65-F5344CB8AC3E}">
@@ -16000,6 +16625,35 @@
           </a:prstGeom>
         </p:spPr>
       </p:pic>
+      <p:sp>
+        <p:nvSpPr>
+          <p:cNvPr id="4" name="Slide Number Placeholder 3">
+            <a:extLst>
+              <a:ext uri="{FF2B5EF4-FFF2-40B4-BE49-F238E27FC236}">
+                <a16:creationId xmlns:a16="http://schemas.microsoft.com/office/drawing/2014/main" id="{F56BA137-B8C4-804B-BF19-9DD652E128E0}"/>
+              </a:ext>
+            </a:extLst>
+          </p:cNvPr>
+          <p:cNvSpPr>
+            <a:spLocks noGrp="1"/>
+          </p:cNvSpPr>
+          <p:nvPr>
+            <p:ph type="sldNum" sz="quarter" idx="12"/>
+          </p:nvPr>
+        </p:nvSpPr>
+        <p:spPr/>
+        <p:txBody>
+          <a:bodyPr/>
+          <a:lstStyle/>
+          <a:p>
+            <a:fld id="{31DE2C5B-556E-47B8-A792-024C2FCA4ACC}" type="slidenum">
+              <a:rPr lang="en-GB" smtClean="0"/>
+              <a:t>30</a:t>
+            </a:fld>
+            <a:endParaRPr lang="en-GB"/>
+          </a:p>
+        </p:txBody>
+      </p:sp>
     </p:spTree>
     <p:extLst>
       <p:ext uri="{BB962C8B-B14F-4D97-AF65-F5344CB8AC3E}">
@@ -16185,6 +16839,35 @@
           </a:p>
         </p:txBody>
       </p:sp>
+      <p:sp>
+        <p:nvSpPr>
+          <p:cNvPr id="4" name="Slide Number Placeholder 3">
+            <a:extLst>
+              <a:ext uri="{FF2B5EF4-FFF2-40B4-BE49-F238E27FC236}">
+                <a16:creationId xmlns:a16="http://schemas.microsoft.com/office/drawing/2014/main" id="{012DB102-751C-5147-BE9D-34FFEC9518C5}"/>
+              </a:ext>
+            </a:extLst>
+          </p:cNvPr>
+          <p:cNvSpPr>
+            <a:spLocks noGrp="1"/>
+          </p:cNvSpPr>
+          <p:nvPr>
+            <p:ph type="sldNum" sz="quarter" idx="12"/>
+          </p:nvPr>
+        </p:nvSpPr>
+        <p:spPr/>
+        <p:txBody>
+          <a:bodyPr/>
+          <a:lstStyle/>
+          <a:p>
+            <a:fld id="{31DE2C5B-556E-47B8-A792-024C2FCA4ACC}" type="slidenum">
+              <a:rPr lang="en-GB" smtClean="0"/>
+              <a:t>31</a:t>
+            </a:fld>
+            <a:endParaRPr lang="en-GB"/>
+          </a:p>
+        </p:txBody>
+      </p:sp>
     </p:spTree>
     <p:extLst>
       <p:ext uri="{BB962C8B-B14F-4D97-AF65-F5344CB8AC3E}">
@@ -16380,6 +17063,35 @@
           </a:prstGeom>
         </p:spPr>
       </p:pic>
+      <p:sp>
+        <p:nvSpPr>
+          <p:cNvPr id="4" name="Slide Number Placeholder 3">
+            <a:extLst>
+              <a:ext uri="{FF2B5EF4-FFF2-40B4-BE49-F238E27FC236}">
+                <a16:creationId xmlns:a16="http://schemas.microsoft.com/office/drawing/2014/main" id="{7636AEBA-0870-7E40-AE91-2A9D7FBF6C6A}"/>
+              </a:ext>
+            </a:extLst>
+          </p:cNvPr>
+          <p:cNvSpPr>
+            <a:spLocks noGrp="1"/>
+          </p:cNvSpPr>
+          <p:nvPr>
+            <p:ph type="sldNum" sz="quarter" idx="12"/>
+          </p:nvPr>
+        </p:nvSpPr>
+        <p:spPr/>
+        <p:txBody>
+          <a:bodyPr/>
+          <a:lstStyle/>
+          <a:p>
+            <a:fld id="{31DE2C5B-556E-47B8-A792-024C2FCA4ACC}" type="slidenum">
+              <a:rPr lang="en-GB" smtClean="0"/>
+              <a:t>32</a:t>
+            </a:fld>
+            <a:endParaRPr lang="en-GB"/>
+          </a:p>
+        </p:txBody>
+      </p:sp>
     </p:spTree>
     <p:extLst>
       <p:ext uri="{BB962C8B-B14F-4D97-AF65-F5344CB8AC3E}">
@@ -16842,6 +17554,35 @@
           </a:fontRef>
         </p:style>
       </p:cxnSp>
+      <p:sp>
+        <p:nvSpPr>
+          <p:cNvPr id="4" name="Slide Number Placeholder 3">
+            <a:extLst>
+              <a:ext uri="{FF2B5EF4-FFF2-40B4-BE49-F238E27FC236}">
+                <a16:creationId xmlns:a16="http://schemas.microsoft.com/office/drawing/2014/main" id="{60AD85F2-3001-6840-A043-66121A7CDD44}"/>
+              </a:ext>
+            </a:extLst>
+          </p:cNvPr>
+          <p:cNvSpPr>
+            <a:spLocks noGrp="1"/>
+          </p:cNvSpPr>
+          <p:nvPr>
+            <p:ph type="sldNum" sz="quarter" idx="12"/>
+          </p:nvPr>
+        </p:nvSpPr>
+        <p:spPr/>
+        <p:txBody>
+          <a:bodyPr/>
+          <a:lstStyle/>
+          <a:p>
+            <a:fld id="{31DE2C5B-556E-47B8-A792-024C2FCA4ACC}" type="slidenum">
+              <a:rPr lang="en-GB" smtClean="0"/>
+              <a:t>33</a:t>
+            </a:fld>
+            <a:endParaRPr lang="en-GB"/>
+          </a:p>
+        </p:txBody>
+      </p:sp>
     </p:spTree>
     <p:extLst>
       <p:ext uri="{BB962C8B-B14F-4D97-AF65-F5344CB8AC3E}">
@@ -17081,6 +17822,35 @@
           </a:prstGeom>
         </p:spPr>
       </p:pic>
+      <p:sp>
+        <p:nvSpPr>
+          <p:cNvPr id="4" name="Slide Number Placeholder 3">
+            <a:extLst>
+              <a:ext uri="{FF2B5EF4-FFF2-40B4-BE49-F238E27FC236}">
+                <a16:creationId xmlns:a16="http://schemas.microsoft.com/office/drawing/2014/main" id="{49AD560C-4077-2C45-AA2B-0E46CD8941FB}"/>
+              </a:ext>
+            </a:extLst>
+          </p:cNvPr>
+          <p:cNvSpPr>
+            <a:spLocks noGrp="1"/>
+          </p:cNvSpPr>
+          <p:nvPr>
+            <p:ph type="sldNum" sz="quarter" idx="12"/>
+          </p:nvPr>
+        </p:nvSpPr>
+        <p:spPr/>
+        <p:txBody>
+          <a:bodyPr/>
+          <a:lstStyle/>
+          <a:p>
+            <a:fld id="{31DE2C5B-556E-47B8-A792-024C2FCA4ACC}" type="slidenum">
+              <a:rPr lang="en-GB" smtClean="0"/>
+              <a:t>34</a:t>
+            </a:fld>
+            <a:endParaRPr lang="en-GB"/>
+          </a:p>
+        </p:txBody>
+      </p:sp>
     </p:spTree>
     <p:extLst>
       <p:ext uri="{BB962C8B-B14F-4D97-AF65-F5344CB8AC3E}">
@@ -17277,6 +18047,35 @@
           </a:ln>
         </p:spPr>
       </p:pic>
+      <p:sp>
+        <p:nvSpPr>
+          <p:cNvPr id="4" name="Slide Number Placeholder 3">
+            <a:extLst>
+              <a:ext uri="{FF2B5EF4-FFF2-40B4-BE49-F238E27FC236}">
+                <a16:creationId xmlns:a16="http://schemas.microsoft.com/office/drawing/2014/main" id="{C954B7E1-4A4A-5B49-8914-B24E6BDBAA89}"/>
+              </a:ext>
+            </a:extLst>
+          </p:cNvPr>
+          <p:cNvSpPr>
+            <a:spLocks noGrp="1"/>
+          </p:cNvSpPr>
+          <p:nvPr>
+            <p:ph type="sldNum" sz="quarter" idx="12"/>
+          </p:nvPr>
+        </p:nvSpPr>
+        <p:spPr/>
+        <p:txBody>
+          <a:bodyPr/>
+          <a:lstStyle/>
+          <a:p>
+            <a:fld id="{31DE2C5B-556E-47B8-A792-024C2FCA4ACC}" type="slidenum">
+              <a:rPr lang="en-GB" smtClean="0"/>
+              <a:t>35</a:t>
+            </a:fld>
+            <a:endParaRPr lang="en-GB"/>
+          </a:p>
+        </p:txBody>
+      </p:sp>
     </p:spTree>
     <p:extLst>
       <p:ext uri="{BB962C8B-B14F-4D97-AF65-F5344CB8AC3E}">
@@ -17555,6 +18354,35 @@
           </a:prstGeom>
         </p:spPr>
       </p:pic>
+      <p:sp>
+        <p:nvSpPr>
+          <p:cNvPr id="4" name="Slide Number Placeholder 3">
+            <a:extLst>
+              <a:ext uri="{FF2B5EF4-FFF2-40B4-BE49-F238E27FC236}">
+                <a16:creationId xmlns:a16="http://schemas.microsoft.com/office/drawing/2014/main" id="{B7FF3741-660A-9F47-93E3-C536546031B3}"/>
+              </a:ext>
+            </a:extLst>
+          </p:cNvPr>
+          <p:cNvSpPr>
+            <a:spLocks noGrp="1"/>
+          </p:cNvSpPr>
+          <p:nvPr>
+            <p:ph type="sldNum" sz="quarter" idx="12"/>
+          </p:nvPr>
+        </p:nvSpPr>
+        <p:spPr/>
+        <p:txBody>
+          <a:bodyPr/>
+          <a:lstStyle/>
+          <a:p>
+            <a:fld id="{31DE2C5B-556E-47B8-A792-024C2FCA4ACC}" type="slidenum">
+              <a:rPr lang="en-GB" smtClean="0"/>
+              <a:t>36</a:t>
+            </a:fld>
+            <a:endParaRPr lang="en-GB"/>
+          </a:p>
+        </p:txBody>
+      </p:sp>
     </p:spTree>
     <p:extLst>
       <p:ext uri="{BB962C8B-B14F-4D97-AF65-F5344CB8AC3E}">
@@ -17739,6 +18567,35 @@
           </a:prstGeom>
         </p:spPr>
       </p:pic>
+      <p:sp>
+        <p:nvSpPr>
+          <p:cNvPr id="4" name="Slide Number Placeholder 3">
+            <a:extLst>
+              <a:ext uri="{FF2B5EF4-FFF2-40B4-BE49-F238E27FC236}">
+                <a16:creationId xmlns:a16="http://schemas.microsoft.com/office/drawing/2014/main" id="{08D159EB-DDAC-5542-81F0-A86EA519B3E5}"/>
+              </a:ext>
+            </a:extLst>
+          </p:cNvPr>
+          <p:cNvSpPr>
+            <a:spLocks noGrp="1"/>
+          </p:cNvSpPr>
+          <p:nvPr>
+            <p:ph type="sldNum" sz="quarter" idx="12"/>
+          </p:nvPr>
+        </p:nvSpPr>
+        <p:spPr/>
+        <p:txBody>
+          <a:bodyPr/>
+          <a:lstStyle/>
+          <a:p>
+            <a:fld id="{31DE2C5B-556E-47B8-A792-024C2FCA4ACC}" type="slidenum">
+              <a:rPr lang="en-GB" smtClean="0"/>
+              <a:t>37</a:t>
+            </a:fld>
+            <a:endParaRPr lang="en-GB"/>
+          </a:p>
+        </p:txBody>
+      </p:sp>
     </p:spTree>
     <p:extLst>
       <p:ext uri="{BB962C8B-B14F-4D97-AF65-F5344CB8AC3E}">
@@ -18375,6 +19232,35 @@
           </a:fontRef>
         </p:style>
       </p:cxnSp>
+      <p:sp>
+        <p:nvSpPr>
+          <p:cNvPr id="4" name="Slide Number Placeholder 3">
+            <a:extLst>
+              <a:ext uri="{FF2B5EF4-FFF2-40B4-BE49-F238E27FC236}">
+                <a16:creationId xmlns:a16="http://schemas.microsoft.com/office/drawing/2014/main" id="{66D268F1-718F-0043-9079-57C597DB9929}"/>
+              </a:ext>
+            </a:extLst>
+          </p:cNvPr>
+          <p:cNvSpPr>
+            <a:spLocks noGrp="1"/>
+          </p:cNvSpPr>
+          <p:nvPr>
+            <p:ph type="sldNum" sz="quarter" idx="12"/>
+          </p:nvPr>
+        </p:nvSpPr>
+        <p:spPr/>
+        <p:txBody>
+          <a:bodyPr/>
+          <a:lstStyle/>
+          <a:p>
+            <a:fld id="{31DE2C5B-556E-47B8-A792-024C2FCA4ACC}" type="slidenum">
+              <a:rPr lang="en-GB" smtClean="0"/>
+              <a:t>38</a:t>
+            </a:fld>
+            <a:endParaRPr lang="en-GB"/>
+          </a:p>
+        </p:txBody>
+      </p:sp>
     </p:spTree>
     <p:extLst>
       <p:ext uri="{BB962C8B-B14F-4D97-AF65-F5344CB8AC3E}">
@@ -18800,6 +19686,35 @@
           </a:p>
         </p:txBody>
       </p:sp>
+      <p:sp>
+        <p:nvSpPr>
+          <p:cNvPr id="5" name="Slide Number Placeholder 4">
+            <a:extLst>
+              <a:ext uri="{FF2B5EF4-FFF2-40B4-BE49-F238E27FC236}">
+                <a16:creationId xmlns:a16="http://schemas.microsoft.com/office/drawing/2014/main" id="{427BB763-A9ED-B449-BCBE-608BFDBAB869}"/>
+              </a:ext>
+            </a:extLst>
+          </p:cNvPr>
+          <p:cNvSpPr>
+            <a:spLocks noGrp="1"/>
+          </p:cNvSpPr>
+          <p:nvPr>
+            <p:ph type="sldNum" sz="quarter" idx="12"/>
+          </p:nvPr>
+        </p:nvSpPr>
+        <p:spPr/>
+        <p:txBody>
+          <a:bodyPr/>
+          <a:lstStyle/>
+          <a:p>
+            <a:fld id="{31DE2C5B-556E-47B8-A792-024C2FCA4ACC}" type="slidenum">
+              <a:rPr lang="en-GB" smtClean="0"/>
+              <a:t>39</a:t>
+            </a:fld>
+            <a:endParaRPr lang="en-GB"/>
+          </a:p>
+        </p:txBody>
+      </p:sp>
     </p:spTree>
     <p:extLst>
       <p:ext uri="{BB962C8B-B14F-4D97-AF65-F5344CB8AC3E}">
@@ -18985,6 +19900,35 @@
           </a:prstGeom>
         </p:spPr>
       </p:pic>
+      <p:sp>
+        <p:nvSpPr>
+          <p:cNvPr id="4" name="Slide Number Placeholder 3">
+            <a:extLst>
+              <a:ext uri="{FF2B5EF4-FFF2-40B4-BE49-F238E27FC236}">
+                <a16:creationId xmlns:a16="http://schemas.microsoft.com/office/drawing/2014/main" id="{04E0336D-308D-2049-B3B0-C7FF90A0B40C}"/>
+              </a:ext>
+            </a:extLst>
+          </p:cNvPr>
+          <p:cNvSpPr>
+            <a:spLocks noGrp="1"/>
+          </p:cNvSpPr>
+          <p:nvPr>
+            <p:ph type="sldNum" sz="quarter" idx="12"/>
+          </p:nvPr>
+        </p:nvSpPr>
+        <p:spPr/>
+        <p:txBody>
+          <a:bodyPr/>
+          <a:lstStyle/>
+          <a:p>
+            <a:fld id="{31DE2C5B-556E-47B8-A792-024C2FCA4ACC}" type="slidenum">
+              <a:rPr lang="en-GB" smtClean="0"/>
+              <a:t>4</a:t>
+            </a:fld>
+            <a:endParaRPr lang="en-GB"/>
+          </a:p>
+        </p:txBody>
+      </p:sp>
     </p:spTree>
     <p:extLst>
       <p:ext uri="{BB962C8B-B14F-4D97-AF65-F5344CB8AC3E}">
@@ -20532,6 +21476,35 @@
           </a:fontRef>
         </p:style>
       </p:cxnSp>
+      <p:sp>
+        <p:nvSpPr>
+          <p:cNvPr id="3" name="Slide Number Placeholder 2">
+            <a:extLst>
+              <a:ext uri="{FF2B5EF4-FFF2-40B4-BE49-F238E27FC236}">
+                <a16:creationId xmlns:a16="http://schemas.microsoft.com/office/drawing/2014/main" id="{7D77C812-0AF0-F942-940A-3EE076ABF656}"/>
+              </a:ext>
+            </a:extLst>
+          </p:cNvPr>
+          <p:cNvSpPr>
+            <a:spLocks noGrp="1"/>
+          </p:cNvSpPr>
+          <p:nvPr>
+            <p:ph type="sldNum" sz="quarter" idx="12"/>
+          </p:nvPr>
+        </p:nvSpPr>
+        <p:spPr/>
+        <p:txBody>
+          <a:bodyPr/>
+          <a:lstStyle/>
+          <a:p>
+            <a:fld id="{31DE2C5B-556E-47B8-A792-024C2FCA4ACC}" type="slidenum">
+              <a:rPr lang="en-GB" smtClean="0"/>
+              <a:t>40</a:t>
+            </a:fld>
+            <a:endParaRPr lang="en-GB"/>
+          </a:p>
+        </p:txBody>
+      </p:sp>
     </p:spTree>
     <p:extLst>
       <p:ext uri="{BB962C8B-B14F-4D97-AF65-F5344CB8AC3E}">
@@ -20717,6 +21690,35 @@
           </a:prstGeom>
         </p:spPr>
       </p:pic>
+      <p:sp>
+        <p:nvSpPr>
+          <p:cNvPr id="4" name="Slide Number Placeholder 3">
+            <a:extLst>
+              <a:ext uri="{FF2B5EF4-FFF2-40B4-BE49-F238E27FC236}">
+                <a16:creationId xmlns:a16="http://schemas.microsoft.com/office/drawing/2014/main" id="{BD9EF363-E83A-EA4F-8414-3F0DCF8EA4B2}"/>
+              </a:ext>
+            </a:extLst>
+          </p:cNvPr>
+          <p:cNvSpPr>
+            <a:spLocks noGrp="1"/>
+          </p:cNvSpPr>
+          <p:nvPr>
+            <p:ph type="sldNum" sz="quarter" idx="12"/>
+          </p:nvPr>
+        </p:nvSpPr>
+        <p:spPr/>
+        <p:txBody>
+          <a:bodyPr/>
+          <a:lstStyle/>
+          <a:p>
+            <a:fld id="{31DE2C5B-556E-47B8-A792-024C2FCA4ACC}" type="slidenum">
+              <a:rPr lang="en-GB" smtClean="0"/>
+              <a:t>41</a:t>
+            </a:fld>
+            <a:endParaRPr lang="en-GB"/>
+          </a:p>
+        </p:txBody>
+      </p:sp>
     </p:spTree>
     <p:extLst>
       <p:ext uri="{BB962C8B-B14F-4D97-AF65-F5344CB8AC3E}">
@@ -20841,7 +21843,17 @@
             </a:r>
             <a:r>
               <a:rPr lang="en-US" dirty="0"/>
-              <a:t>that creates an instance of…</a:t>
+              <a:t>that creates an instance of the </a:t>
+            </a:r>
+            <a:r>
+              <a:rPr lang="en-US" dirty="0">
+                <a:latin typeface="Courier" pitchFamily="2" charset="0"/>
+              </a:rPr>
+              <a:t>Widget</a:t>
+            </a:r>
+            <a:r>
+              <a:rPr lang="en-US" dirty="0"/>
+              <a:t> itself</a:t>
             </a:r>
           </a:p>
           <a:p>
@@ -20858,7 +21870,7 @@
             </a:pPr>
             <a:r>
               <a:rPr lang="en-US" dirty="0"/>
-              <a:t> …a </a:t>
+              <a:t>A </a:t>
             </a:r>
             <a:r>
               <a:rPr lang="en-US" b="1" dirty="0">
@@ -20868,37 +21880,24 @@
             </a:r>
             <a:r>
               <a:rPr lang="en-US" b="1" dirty="0"/>
-              <a:t> class</a:t>
+              <a:t> class: </a:t>
             </a:r>
             <a:r>
               <a:rPr lang="en-US" dirty="0"/>
-              <a:t>. </a:t>
-            </a:r>
-          </a:p>
-          <a:p>
-            <a:pPr marL="914400" lvl="1" indent="-457200">
-              <a:buFont typeface="+mj-lt"/>
-              <a:buAutoNum type="arabicPeriod"/>
+              <a:t>a class that manages the state of the </a:t>
+            </a:r>
+            <a:r>
+              <a:rPr lang="en-US" b="1" dirty="0" err="1">
+                <a:latin typeface="Courier" pitchFamily="2" charset="0"/>
+              </a:rPr>
+              <a:t>StatefulWidget</a:t>
+            </a:r>
+            <a:endParaRPr lang="en-US" dirty="0"/>
+          </a:p>
+          <a:p>
+            <a:pPr marL="0" indent="0">
+              <a:buNone/>
             </a:pPr>
-            <a:endParaRPr lang="en-US" dirty="0"/>
-          </a:p>
-          <a:p>
-            <a:r>
-              <a:rPr lang="en-US" dirty="0"/>
-              <a:t>Note: The </a:t>
-            </a:r>
-            <a:r>
-              <a:rPr lang="en-US" dirty="0" err="1">
-                <a:latin typeface="Courier" pitchFamily="2" charset="0"/>
-              </a:rPr>
-              <a:t>StatefulWidget</a:t>
-            </a:r>
-            <a:r>
-              <a:rPr lang="en-US" dirty="0"/>
-              <a:t> class is, itself, immutable and can be thrown away and regenerated, but the State class persists over the lifetime of the widget.</a:t>
-            </a:r>
-          </a:p>
-          <a:p>
             <a:endParaRPr lang="en-US" dirty="0"/>
           </a:p>
           <a:p>
@@ -20921,6 +21920,35 @@
               <a:buAutoNum type="arabicPeriod"/>
             </a:pPr>
             <a:endParaRPr lang="en-US" dirty="0"/>
+          </a:p>
+        </p:txBody>
+      </p:sp>
+      <p:sp>
+        <p:nvSpPr>
+          <p:cNvPr id="4" name="Slide Number Placeholder 3">
+            <a:extLst>
+              <a:ext uri="{FF2B5EF4-FFF2-40B4-BE49-F238E27FC236}">
+                <a16:creationId xmlns:a16="http://schemas.microsoft.com/office/drawing/2014/main" id="{A74A3EEA-F317-1147-8750-EC5526CAB846}"/>
+              </a:ext>
+            </a:extLst>
+          </p:cNvPr>
+          <p:cNvSpPr>
+            <a:spLocks noGrp="1"/>
+          </p:cNvSpPr>
+          <p:nvPr>
+            <p:ph type="sldNum" sz="quarter" idx="12"/>
+          </p:nvPr>
+        </p:nvSpPr>
+        <p:spPr/>
+        <p:txBody>
+          <a:bodyPr/>
+          <a:lstStyle/>
+          <a:p>
+            <a:fld id="{31DE2C5B-556E-47B8-A792-024C2FCA4ACC}" type="slidenum">
+              <a:rPr lang="en-GB" smtClean="0"/>
+              <a:t>42</a:t>
+            </a:fld>
+            <a:endParaRPr lang="en-GB"/>
           </a:p>
         </p:txBody>
       </p:sp>
@@ -21313,92 +22341,33 @@
       </p:sp>
       <p:sp>
         <p:nvSpPr>
-          <p:cNvPr id="7" name="Rectangle 6">
-            <a:extLst>
-              <a:ext uri="{FF2B5EF4-FFF2-40B4-BE49-F238E27FC236}">
-                <a16:creationId xmlns:a16="http://schemas.microsoft.com/office/drawing/2014/main" id="{A988C7C5-64F3-E44F-921F-5AFF0F4F7D0C}"/>
-              </a:ext>
-            </a:extLst>
-          </p:cNvPr>
-          <p:cNvSpPr/>
-          <p:nvPr/>
-        </p:nvSpPr>
-        <p:spPr>
-          <a:xfrm>
-            <a:off x="8457961" y="4463158"/>
-            <a:ext cx="2976106" cy="1477328"/>
-          </a:xfrm>
-          <a:prstGeom prst="rect">
-            <a:avLst/>
-          </a:prstGeom>
-          <a:solidFill>
-            <a:schemeClr val="accent6">
-              <a:lumMod val="40000"/>
-              <a:lumOff val="60000"/>
-            </a:schemeClr>
-          </a:solidFill>
-        </p:spPr>
-        <p:txBody>
-          <a:bodyPr wrap="square">
-            <a:spAutoFit/>
-          </a:bodyPr>
-          <a:lstStyle/>
-          <a:p>
-            <a:pPr algn="ctr"/>
-            <a:r>
-              <a:rPr lang="en-GB" b="1" dirty="0">
-                <a:latin typeface="Palatino Linotype" panose="02040502050505030304" pitchFamily="18" charset="0"/>
-              </a:rPr>
-              <a:t>Note: the state is private to the Widget. Not necessary, but it is a good practice to understand what is private and what is not.</a:t>
-            </a:r>
-            <a:endParaRPr lang="en-IT" dirty="0">
-              <a:latin typeface="Palatino Linotype" panose="02040502050505030304" pitchFamily="18" charset="0"/>
-            </a:endParaRPr>
-          </a:p>
-        </p:txBody>
-      </p:sp>
-      <p:cxnSp>
-        <p:nvCxnSpPr>
-          <p:cNvPr id="8" name="Straight Arrow Connector 7">
-            <a:extLst>
-              <a:ext uri="{FF2B5EF4-FFF2-40B4-BE49-F238E27FC236}">
-                <a16:creationId xmlns:a16="http://schemas.microsoft.com/office/drawing/2014/main" id="{9FEB281E-C3CD-B34F-B37D-D7278B2566E1}"/>
-              </a:ext>
-            </a:extLst>
-          </p:cNvPr>
-          <p:cNvCxnSpPr>
-            <a:cxnSpLocks/>
-            <a:stCxn id="7" idx="1"/>
-          </p:cNvCxnSpPr>
-          <p:nvPr/>
-        </p:nvCxnSpPr>
-        <p:spPr>
-          <a:xfrm flipH="1" flipV="1">
-            <a:off x="1385047" y="4020673"/>
-            <a:ext cx="7072914" cy="1181149"/>
-          </a:xfrm>
-          <a:prstGeom prst="straightConnector1">
-            <a:avLst/>
-          </a:prstGeom>
-          <a:ln>
-            <a:tailEnd type="triangle"/>
-          </a:ln>
-        </p:spPr>
-        <p:style>
-          <a:lnRef idx="1">
-            <a:schemeClr val="accent6"/>
-          </a:lnRef>
-          <a:fillRef idx="0">
-            <a:schemeClr val="accent6"/>
-          </a:fillRef>
-          <a:effectRef idx="0">
-            <a:schemeClr val="accent6"/>
-          </a:effectRef>
-          <a:fontRef idx="minor">
-            <a:schemeClr val="tx1"/>
-          </a:fontRef>
-        </p:style>
-      </p:cxnSp>
+          <p:cNvPr id="3" name="Slide Number Placeholder 2">
+            <a:extLst>
+              <a:ext uri="{FF2B5EF4-FFF2-40B4-BE49-F238E27FC236}">
+                <a16:creationId xmlns:a16="http://schemas.microsoft.com/office/drawing/2014/main" id="{3FE36FA5-F059-2D45-BCF7-3130ADDA7D5F}"/>
+              </a:ext>
+            </a:extLst>
+          </p:cNvPr>
+          <p:cNvSpPr>
+            <a:spLocks noGrp="1"/>
+          </p:cNvSpPr>
+          <p:nvPr>
+            <p:ph type="sldNum" sz="quarter" idx="12"/>
+          </p:nvPr>
+        </p:nvSpPr>
+        <p:spPr/>
+        <p:txBody>
+          <a:bodyPr/>
+          <a:lstStyle/>
+          <a:p>
+            <a:fld id="{31DE2C5B-556E-47B8-A792-024C2FCA4ACC}" type="slidenum">
+              <a:rPr lang="en-GB" smtClean="0"/>
+              <a:t>43</a:t>
+            </a:fld>
+            <a:endParaRPr lang="en-GB"/>
+          </a:p>
+        </p:txBody>
+      </p:sp>
     </p:spTree>
     <p:extLst>
       <p:ext uri="{BB962C8B-B14F-4D97-AF65-F5344CB8AC3E}">
@@ -21781,6 +22750,35 @@
           </a:p>
         </p:txBody>
       </p:sp>
+      <p:sp>
+        <p:nvSpPr>
+          <p:cNvPr id="3" name="Slide Number Placeholder 2">
+            <a:extLst>
+              <a:ext uri="{FF2B5EF4-FFF2-40B4-BE49-F238E27FC236}">
+                <a16:creationId xmlns:a16="http://schemas.microsoft.com/office/drawing/2014/main" id="{8E43A2BD-138B-0C43-907D-4DD6CD0B00B4}"/>
+              </a:ext>
+            </a:extLst>
+          </p:cNvPr>
+          <p:cNvSpPr>
+            <a:spLocks noGrp="1"/>
+          </p:cNvSpPr>
+          <p:nvPr>
+            <p:ph type="sldNum" sz="quarter" idx="12"/>
+          </p:nvPr>
+        </p:nvSpPr>
+        <p:spPr/>
+        <p:txBody>
+          <a:bodyPr/>
+          <a:lstStyle/>
+          <a:p>
+            <a:fld id="{31DE2C5B-556E-47B8-A792-024C2FCA4ACC}" type="slidenum">
+              <a:rPr lang="en-GB" smtClean="0"/>
+              <a:t>44</a:t>
+            </a:fld>
+            <a:endParaRPr lang="en-GB"/>
+          </a:p>
+        </p:txBody>
+      </p:sp>
     </p:spTree>
     <p:extLst>
       <p:ext uri="{BB962C8B-B14F-4D97-AF65-F5344CB8AC3E}">
@@ -22183,6 +23181,35 @@
           </a:p>
         </p:txBody>
       </p:sp>
+      <p:sp>
+        <p:nvSpPr>
+          <p:cNvPr id="3" name="Slide Number Placeholder 2">
+            <a:extLst>
+              <a:ext uri="{FF2B5EF4-FFF2-40B4-BE49-F238E27FC236}">
+                <a16:creationId xmlns:a16="http://schemas.microsoft.com/office/drawing/2014/main" id="{7ED2FA61-90F2-5141-A693-B8F4B541889D}"/>
+              </a:ext>
+            </a:extLst>
+          </p:cNvPr>
+          <p:cNvSpPr>
+            <a:spLocks noGrp="1"/>
+          </p:cNvSpPr>
+          <p:nvPr>
+            <p:ph type="sldNum" sz="quarter" idx="12"/>
+          </p:nvPr>
+        </p:nvSpPr>
+        <p:spPr/>
+        <p:txBody>
+          <a:bodyPr/>
+          <a:lstStyle/>
+          <a:p>
+            <a:fld id="{31DE2C5B-556E-47B8-A792-024C2FCA4ACC}" type="slidenum">
+              <a:rPr lang="en-GB" smtClean="0"/>
+              <a:t>45</a:t>
+            </a:fld>
+            <a:endParaRPr lang="en-GB"/>
+          </a:p>
+        </p:txBody>
+      </p:sp>
     </p:spTree>
     <p:extLst>
       <p:ext uri="{BB962C8B-B14F-4D97-AF65-F5344CB8AC3E}">
@@ -24196,6 +25223,35 @@
           </a:fontRef>
         </p:style>
       </p:cxnSp>
+      <p:sp>
+        <p:nvSpPr>
+          <p:cNvPr id="3" name="Slide Number Placeholder 2">
+            <a:extLst>
+              <a:ext uri="{FF2B5EF4-FFF2-40B4-BE49-F238E27FC236}">
+                <a16:creationId xmlns:a16="http://schemas.microsoft.com/office/drawing/2014/main" id="{83BD4F05-2189-AD42-AE91-4901D7296A37}"/>
+              </a:ext>
+            </a:extLst>
+          </p:cNvPr>
+          <p:cNvSpPr>
+            <a:spLocks noGrp="1"/>
+          </p:cNvSpPr>
+          <p:nvPr>
+            <p:ph type="sldNum" sz="quarter" idx="12"/>
+          </p:nvPr>
+        </p:nvSpPr>
+        <p:spPr/>
+        <p:txBody>
+          <a:bodyPr/>
+          <a:lstStyle/>
+          <a:p>
+            <a:fld id="{31DE2C5B-556E-47B8-A792-024C2FCA4ACC}" type="slidenum">
+              <a:rPr lang="en-GB" smtClean="0"/>
+              <a:t>46</a:t>
+            </a:fld>
+            <a:endParaRPr lang="en-GB"/>
+          </a:p>
+        </p:txBody>
+      </p:sp>
     </p:spTree>
     <p:extLst>
       <p:ext uri="{BB962C8B-B14F-4D97-AF65-F5344CB8AC3E}">
@@ -24690,6 +25746,35 @@
           </a:fontRef>
         </p:style>
       </p:cxnSp>
+      <p:sp>
+        <p:nvSpPr>
+          <p:cNvPr id="5" name="Slide Number Placeholder 4">
+            <a:extLst>
+              <a:ext uri="{FF2B5EF4-FFF2-40B4-BE49-F238E27FC236}">
+                <a16:creationId xmlns:a16="http://schemas.microsoft.com/office/drawing/2014/main" id="{AE2A0CD4-788E-7046-81DA-0F927C2747AE}"/>
+              </a:ext>
+            </a:extLst>
+          </p:cNvPr>
+          <p:cNvSpPr>
+            <a:spLocks noGrp="1"/>
+          </p:cNvSpPr>
+          <p:nvPr>
+            <p:ph type="sldNum" sz="quarter" idx="12"/>
+          </p:nvPr>
+        </p:nvSpPr>
+        <p:spPr/>
+        <p:txBody>
+          <a:bodyPr/>
+          <a:lstStyle/>
+          <a:p>
+            <a:fld id="{31DE2C5B-556E-47B8-A792-024C2FCA4ACC}" type="slidenum">
+              <a:rPr lang="en-GB" smtClean="0"/>
+              <a:t>47</a:t>
+            </a:fld>
+            <a:endParaRPr lang="en-GB"/>
+          </a:p>
+        </p:txBody>
+      </p:sp>
     </p:spTree>
     <p:extLst>
       <p:ext uri="{BB962C8B-B14F-4D97-AF65-F5344CB8AC3E}">
@@ -24968,7 +26053,7 @@
               <a:rPr lang="en-GB" dirty="0" err="1">
                 <a:latin typeface="Courier" pitchFamily="2" charset="0"/>
               </a:rPr>
-              <a:t>changeWord</a:t>
+              <a:t>changeRandomWord</a:t>
             </a:r>
             <a:r>
               <a:rPr lang="en-GB" dirty="0">
@@ -25261,6 +26346,35 @@
           </a:fontRef>
         </p:style>
       </p:cxnSp>
+      <p:sp>
+        <p:nvSpPr>
+          <p:cNvPr id="5" name="Slide Number Placeholder 4">
+            <a:extLst>
+              <a:ext uri="{FF2B5EF4-FFF2-40B4-BE49-F238E27FC236}">
+                <a16:creationId xmlns:a16="http://schemas.microsoft.com/office/drawing/2014/main" id="{97F1F003-AFB6-5144-AD26-9E170FEBA92E}"/>
+              </a:ext>
+            </a:extLst>
+          </p:cNvPr>
+          <p:cNvSpPr>
+            <a:spLocks noGrp="1"/>
+          </p:cNvSpPr>
+          <p:nvPr>
+            <p:ph type="sldNum" sz="quarter" idx="12"/>
+          </p:nvPr>
+        </p:nvSpPr>
+        <p:spPr/>
+        <p:txBody>
+          <a:bodyPr/>
+          <a:lstStyle/>
+          <a:p>
+            <a:fld id="{31DE2C5B-556E-47B8-A792-024C2FCA4ACC}" type="slidenum">
+              <a:rPr lang="en-GB" smtClean="0"/>
+              <a:t>48</a:t>
+            </a:fld>
+            <a:endParaRPr lang="en-GB"/>
+          </a:p>
+        </p:txBody>
+      </p:sp>
     </p:spTree>
     <p:extLst>
       <p:ext uri="{BB962C8B-B14F-4D97-AF65-F5344CB8AC3E}">
@@ -25803,6 +26917,35 @@
           </a:p>
         </p:txBody>
       </p:sp>
+      <p:sp>
+        <p:nvSpPr>
+          <p:cNvPr id="4" name="Slide Number Placeholder 3">
+            <a:extLst>
+              <a:ext uri="{FF2B5EF4-FFF2-40B4-BE49-F238E27FC236}">
+                <a16:creationId xmlns:a16="http://schemas.microsoft.com/office/drawing/2014/main" id="{A47BC04F-8C3C-9A44-A4D8-173F19F0FFD1}"/>
+              </a:ext>
+            </a:extLst>
+          </p:cNvPr>
+          <p:cNvSpPr>
+            <a:spLocks noGrp="1"/>
+          </p:cNvSpPr>
+          <p:nvPr>
+            <p:ph type="sldNum" sz="quarter" idx="12"/>
+          </p:nvPr>
+        </p:nvSpPr>
+        <p:spPr/>
+        <p:txBody>
+          <a:bodyPr/>
+          <a:lstStyle/>
+          <a:p>
+            <a:fld id="{31DE2C5B-556E-47B8-A792-024C2FCA4ACC}" type="slidenum">
+              <a:rPr lang="en-GB" smtClean="0"/>
+              <a:t>49</a:t>
+            </a:fld>
+            <a:endParaRPr lang="en-GB"/>
+          </a:p>
+        </p:txBody>
+      </p:sp>
     </p:spTree>
     <p:extLst>
       <p:ext uri="{BB962C8B-B14F-4D97-AF65-F5344CB8AC3E}">
@@ -25892,7 +27035,7 @@
           <a:p>
             <a:r>
               <a:rPr lang="en-IT" dirty="0"/>
-              <a:t>What you’ll see in these labs about Flutter examples</a:t>
+              <a:t>What you’ll see in these labs about Flutter capabilities</a:t>
             </a:r>
           </a:p>
           <a:p>
@@ -26098,6 +27241,35 @@
           </a:fontRef>
         </p:style>
       </p:cxnSp>
+      <p:sp>
+        <p:nvSpPr>
+          <p:cNvPr id="3" name="Slide Number Placeholder 2">
+            <a:extLst>
+              <a:ext uri="{FF2B5EF4-FFF2-40B4-BE49-F238E27FC236}">
+                <a16:creationId xmlns:a16="http://schemas.microsoft.com/office/drawing/2014/main" id="{CC7F8063-66E4-8F4F-B2B6-3152513F1558}"/>
+              </a:ext>
+            </a:extLst>
+          </p:cNvPr>
+          <p:cNvSpPr>
+            <a:spLocks noGrp="1"/>
+          </p:cNvSpPr>
+          <p:nvPr>
+            <p:ph type="sldNum" sz="quarter" idx="12"/>
+          </p:nvPr>
+        </p:nvSpPr>
+        <p:spPr/>
+        <p:txBody>
+          <a:bodyPr/>
+          <a:lstStyle/>
+          <a:p>
+            <a:fld id="{31DE2C5B-556E-47B8-A792-024C2FCA4ACC}" type="slidenum">
+              <a:rPr lang="en-GB" smtClean="0"/>
+              <a:t>5</a:t>
+            </a:fld>
+            <a:endParaRPr lang="en-GB"/>
+          </a:p>
+        </p:txBody>
+      </p:sp>
     </p:spTree>
     <p:extLst>
       <p:ext uri="{BB962C8B-B14F-4D97-AF65-F5344CB8AC3E}">
@@ -26246,6 +27418,35 @@
           </a:p>
         </p:txBody>
       </p:sp>
+      <p:sp>
+        <p:nvSpPr>
+          <p:cNvPr id="4" name="Slide Number Placeholder 3">
+            <a:extLst>
+              <a:ext uri="{FF2B5EF4-FFF2-40B4-BE49-F238E27FC236}">
+                <a16:creationId xmlns:a16="http://schemas.microsoft.com/office/drawing/2014/main" id="{8AD44751-EEE6-C14A-807C-B09D1831E5D2}"/>
+              </a:ext>
+            </a:extLst>
+          </p:cNvPr>
+          <p:cNvSpPr>
+            <a:spLocks noGrp="1"/>
+          </p:cNvSpPr>
+          <p:nvPr>
+            <p:ph type="sldNum" sz="quarter" idx="12"/>
+          </p:nvPr>
+        </p:nvSpPr>
+        <p:spPr/>
+        <p:txBody>
+          <a:bodyPr/>
+          <a:lstStyle/>
+          <a:p>
+            <a:fld id="{31DE2C5B-556E-47B8-A792-024C2FCA4ACC}" type="slidenum">
+              <a:rPr lang="en-GB" smtClean="0"/>
+              <a:t>50</a:t>
+            </a:fld>
+            <a:endParaRPr lang="en-GB"/>
+          </a:p>
+        </p:txBody>
+      </p:sp>
     </p:spTree>
     <p:extLst>
       <p:ext uri="{BB962C8B-B14F-4D97-AF65-F5344CB8AC3E}">
@@ -26334,6 +27535,15 @@
           <a:p>
             <a:r>
               <a:rPr lang="en-GB" dirty="0"/>
+              <a:t>Play with our first example</a:t>
+            </a:r>
+          </a:p>
+          <a:p>
+            <a:endParaRPr lang="en-GB" dirty="0"/>
+          </a:p>
+          <a:p>
+            <a:r>
+              <a:rPr lang="en-GB" dirty="0"/>
               <a:t>Get familiar with the structure of a Flutter project and how to install new packages using </a:t>
             </a:r>
             <a:r>
@@ -26381,28 +27591,43 @@
               <a:rPr lang="en-GB" dirty="0"/>
               <a:t>Understanding the Flutter flow</a:t>
             </a:r>
-          </a:p>
-          <a:p>
-            <a:endParaRPr lang="en-GB" dirty="0"/>
-          </a:p>
-          <a:p>
-            <a:endParaRPr lang="en-GB" dirty="0"/>
-          </a:p>
-          <a:p>
-            <a:pPr marL="0" indent="0">
-              <a:buNone/>
-            </a:pPr>
-            <a:br>
-              <a:rPr lang="en-GB" dirty="0"/>
-            </a:br>
             <a:endParaRPr lang="en-IT" dirty="0"/>
+          </a:p>
+        </p:txBody>
+      </p:sp>
+      <p:sp>
+        <p:nvSpPr>
+          <p:cNvPr id="4" name="Slide Number Placeholder 3">
+            <a:extLst>
+              <a:ext uri="{FF2B5EF4-FFF2-40B4-BE49-F238E27FC236}">
+                <a16:creationId xmlns:a16="http://schemas.microsoft.com/office/drawing/2014/main" id="{E887B916-209C-5F4F-B5A8-7C2554990641}"/>
+              </a:ext>
+            </a:extLst>
+          </p:cNvPr>
+          <p:cNvSpPr>
+            <a:spLocks noGrp="1"/>
+          </p:cNvSpPr>
+          <p:nvPr>
+            <p:ph type="sldNum" sz="quarter" idx="12"/>
+          </p:nvPr>
+        </p:nvSpPr>
+        <p:spPr/>
+        <p:txBody>
+          <a:bodyPr/>
+          <a:lstStyle/>
+          <a:p>
+            <a:fld id="{31DE2C5B-556E-47B8-A792-024C2FCA4ACC}" type="slidenum">
+              <a:rPr lang="en-GB" smtClean="0"/>
+              <a:t>51</a:t>
+            </a:fld>
+            <a:endParaRPr lang="en-GB"/>
           </a:p>
         </p:txBody>
       </p:sp>
     </p:spTree>
     <p:extLst>
       <p:ext uri="{BB962C8B-B14F-4D97-AF65-F5344CB8AC3E}">
-        <p14:creationId xmlns:p14="http://schemas.microsoft.com/office/powerpoint/2010/main" val="895378464"/>
+        <p14:creationId xmlns:p14="http://schemas.microsoft.com/office/powerpoint/2010/main" val="1831920630"/>
       </p:ext>
     </p:extLst>
   </p:cSld>
@@ -26552,6 +27777,35 @@
               <a:t> ∂</a:t>
             </a:r>
             <a:endParaRPr lang="en-IT" dirty="0"/>
+          </a:p>
+        </p:txBody>
+      </p:sp>
+      <p:sp>
+        <p:nvSpPr>
+          <p:cNvPr id="4" name="Slide Number Placeholder 3">
+            <a:extLst>
+              <a:ext uri="{FF2B5EF4-FFF2-40B4-BE49-F238E27FC236}">
+                <a16:creationId xmlns:a16="http://schemas.microsoft.com/office/drawing/2014/main" id="{2EFB613E-6C5B-2547-8369-6F6CEC16926B}"/>
+              </a:ext>
+            </a:extLst>
+          </p:cNvPr>
+          <p:cNvSpPr>
+            <a:spLocks noGrp="1"/>
+          </p:cNvSpPr>
+          <p:nvPr>
+            <p:ph type="sldNum" sz="quarter" idx="12"/>
+          </p:nvPr>
+        </p:nvSpPr>
+        <p:spPr/>
+        <p:txBody>
+          <a:bodyPr/>
+          <a:lstStyle/>
+          <a:p>
+            <a:fld id="{31DE2C5B-556E-47B8-A792-024C2FCA4ACC}" type="slidenum">
+              <a:rPr lang="en-GB" smtClean="0"/>
+              <a:t>52</a:t>
+            </a:fld>
+            <a:endParaRPr lang="en-GB"/>
           </a:p>
         </p:txBody>
       </p:sp>
@@ -26715,6 +27969,35 @@
           </a:p>
         </p:txBody>
       </p:sp>
+      <p:sp>
+        <p:nvSpPr>
+          <p:cNvPr id="4" name="Slide Number Placeholder 3">
+            <a:extLst>
+              <a:ext uri="{FF2B5EF4-FFF2-40B4-BE49-F238E27FC236}">
+                <a16:creationId xmlns:a16="http://schemas.microsoft.com/office/drawing/2014/main" id="{A78B72D3-569F-CF43-AF68-C4F130329570}"/>
+              </a:ext>
+            </a:extLst>
+          </p:cNvPr>
+          <p:cNvSpPr>
+            <a:spLocks noGrp="1"/>
+          </p:cNvSpPr>
+          <p:nvPr>
+            <p:ph type="sldNum" sz="quarter" idx="12"/>
+          </p:nvPr>
+        </p:nvSpPr>
+        <p:spPr/>
+        <p:txBody>
+          <a:bodyPr/>
+          <a:lstStyle/>
+          <a:p>
+            <a:fld id="{31DE2C5B-556E-47B8-A792-024C2FCA4ACC}" type="slidenum">
+              <a:rPr lang="en-GB" smtClean="0"/>
+              <a:t>6</a:t>
+            </a:fld>
+            <a:endParaRPr lang="en-GB"/>
+          </a:p>
+        </p:txBody>
+      </p:sp>
     </p:spTree>
     <p:extLst>
       <p:ext uri="{BB962C8B-B14F-4D97-AF65-F5344CB8AC3E}">
@@ -26812,7 +28095,11 @@
           <a:p>
             <a:r>
               <a:rPr lang="en-IT" dirty="0"/>
-              <a:t>First, setup VS Code to work with Flutter</a:t>
+              <a:t>First, setup VS Code to work with Flutter </a:t>
+            </a:r>
+            <a:r>
+              <a:rPr lang="en-IT" b="1" dirty="0"/>
+              <a:t>(this should have already been done) </a:t>
             </a:r>
           </a:p>
           <a:p>
@@ -27004,6 +28291,35 @@
               <a:rPr lang="en-GB" dirty="0"/>
             </a:br>
             <a:endParaRPr lang="en-IT" dirty="0"/>
+          </a:p>
+        </p:txBody>
+      </p:sp>
+      <p:sp>
+        <p:nvSpPr>
+          <p:cNvPr id="4" name="Slide Number Placeholder 3">
+            <a:extLst>
+              <a:ext uri="{FF2B5EF4-FFF2-40B4-BE49-F238E27FC236}">
+                <a16:creationId xmlns:a16="http://schemas.microsoft.com/office/drawing/2014/main" id="{8A847FBE-60CA-6E44-BDBB-26F8D8BAAD3E}"/>
+              </a:ext>
+            </a:extLst>
+          </p:cNvPr>
+          <p:cNvSpPr>
+            <a:spLocks noGrp="1"/>
+          </p:cNvSpPr>
+          <p:nvPr>
+            <p:ph type="sldNum" sz="quarter" idx="12"/>
+          </p:nvPr>
+        </p:nvSpPr>
+        <p:spPr/>
+        <p:txBody>
+          <a:bodyPr/>
+          <a:lstStyle/>
+          <a:p>
+            <a:fld id="{31DE2C5B-556E-47B8-A792-024C2FCA4ACC}" type="slidenum">
+              <a:rPr lang="en-GB" smtClean="0"/>
+              <a:t>7</a:t>
+            </a:fld>
+            <a:endParaRPr lang="en-GB"/>
           </a:p>
         </p:txBody>
       </p:sp>
@@ -27125,7 +28441,7 @@
         </p:nvSpPr>
         <p:spPr>
           <a:xfrm>
-            <a:off x="655092" y="1894760"/>
+            <a:off x="696655" y="1747595"/>
             <a:ext cx="9162197" cy="4801314"/>
           </a:xfrm>
           <a:prstGeom prst="rect">
@@ -27476,6 +28792,35 @@
             <a:endParaRPr lang="en-GB" dirty="0">
               <a:latin typeface="Courier" pitchFamily="2" charset="0"/>
             </a:endParaRPr>
+          </a:p>
+        </p:txBody>
+      </p:sp>
+      <p:sp>
+        <p:nvSpPr>
+          <p:cNvPr id="6" name="Slide Number Placeholder 5">
+            <a:extLst>
+              <a:ext uri="{FF2B5EF4-FFF2-40B4-BE49-F238E27FC236}">
+                <a16:creationId xmlns:a16="http://schemas.microsoft.com/office/drawing/2014/main" id="{1B9C5FE9-2B88-0540-A361-050D02A53418}"/>
+              </a:ext>
+            </a:extLst>
+          </p:cNvPr>
+          <p:cNvSpPr>
+            <a:spLocks noGrp="1"/>
+          </p:cNvSpPr>
+          <p:nvPr>
+            <p:ph type="sldNum" sz="quarter" idx="12"/>
+          </p:nvPr>
+        </p:nvSpPr>
+        <p:spPr/>
+        <p:txBody>
+          <a:bodyPr/>
+          <a:lstStyle/>
+          <a:p>
+            <a:fld id="{31DE2C5B-556E-47B8-A792-024C2FCA4ACC}" type="slidenum">
+              <a:rPr lang="en-GB" smtClean="0"/>
+              <a:t>8</a:t>
+            </a:fld>
+            <a:endParaRPr lang="en-GB"/>
           </a:p>
         </p:txBody>
       </p:sp>
@@ -27687,36 +29032,6 @@
           </a:p>
         </p:txBody>
       </p:sp>
-      <p:pic>
-        <p:nvPicPr>
-          <p:cNvPr id="4" name="Picture 3">
-            <a:extLst>
-              <a:ext uri="{FF2B5EF4-FFF2-40B4-BE49-F238E27FC236}">
-                <a16:creationId xmlns:a16="http://schemas.microsoft.com/office/drawing/2014/main" id="{5258F0C4-7905-4E4B-A10B-D157B5BB2BA5}"/>
-              </a:ext>
-            </a:extLst>
-          </p:cNvPr>
-          <p:cNvPicPr>
-            <a:picLocks noChangeAspect="1"/>
-          </p:cNvPicPr>
-          <p:nvPr/>
-        </p:nvPicPr>
-        <p:blipFill>
-          <a:blip r:embed="rId3"/>
-          <a:stretch>
-            <a:fillRect/>
-          </a:stretch>
-        </p:blipFill>
-        <p:spPr>
-          <a:xfrm>
-            <a:off x="2362294" y="2384394"/>
-            <a:ext cx="5092700" cy="749300"/>
-          </a:xfrm>
-          <a:prstGeom prst="rect">
-            <a:avLst/>
-          </a:prstGeom>
-        </p:spPr>
-      </p:pic>
       <p:cxnSp>
         <p:nvCxnSpPr>
           <p:cNvPr id="6" name="Straight Arrow Connector 5">
@@ -27812,7 +29127,7 @@
           <p:nvPr/>
         </p:nvPicPr>
         <p:blipFill>
-          <a:blip r:embed="rId4">
+          <a:blip r:embed="rId3">
             <a:extLst>
               <a:ext uri="{28A0092B-C50C-407E-A947-70E740481C1C}">
                 <a14:useLocalDpi xmlns:a14="http://schemas.microsoft.com/office/drawing/2010/main" val="0"/>
@@ -27833,6 +29148,71 @@
           </a:prstGeom>
         </p:spPr>
       </p:pic>
+      <p:pic>
+        <p:nvPicPr>
+          <p:cNvPr id="9" name="Picture 8">
+            <a:extLst>
+              <a:ext uri="{FF2B5EF4-FFF2-40B4-BE49-F238E27FC236}">
+                <a16:creationId xmlns:a16="http://schemas.microsoft.com/office/drawing/2014/main" id="{A66F5FB4-676A-FF47-8711-E5AB4335639D}"/>
+              </a:ext>
+            </a:extLst>
+          </p:cNvPr>
+          <p:cNvPicPr>
+            <a:picLocks noChangeAspect="1"/>
+          </p:cNvPicPr>
+          <p:nvPr/>
+        </p:nvPicPr>
+        <p:blipFill>
+          <a:blip r:embed="rId4">
+            <a:extLst>
+              <a:ext uri="{28A0092B-C50C-407E-A947-70E740481C1C}">
+                <a14:useLocalDpi xmlns:a14="http://schemas.microsoft.com/office/drawing/2010/main" val="0"/>
+              </a:ext>
+            </a:extLst>
+          </a:blip>
+          <a:stretch>
+            <a:fillRect/>
+          </a:stretch>
+        </p:blipFill>
+        <p:spPr>
+          <a:xfrm>
+            <a:off x="2119168" y="2629331"/>
+            <a:ext cx="5321300" cy="495300"/>
+          </a:xfrm>
+          <a:prstGeom prst="rect">
+            <a:avLst/>
+          </a:prstGeom>
+        </p:spPr>
+      </p:pic>
+      <p:sp>
+        <p:nvSpPr>
+          <p:cNvPr id="5" name="Slide Number Placeholder 4">
+            <a:extLst>
+              <a:ext uri="{FF2B5EF4-FFF2-40B4-BE49-F238E27FC236}">
+                <a16:creationId xmlns:a16="http://schemas.microsoft.com/office/drawing/2014/main" id="{6ABA60FD-33C7-3044-8C74-0A108A5E5EA8}"/>
+              </a:ext>
+            </a:extLst>
+          </p:cNvPr>
+          <p:cNvSpPr>
+            <a:spLocks noGrp="1"/>
+          </p:cNvSpPr>
+          <p:nvPr>
+            <p:ph type="sldNum" sz="quarter" idx="12"/>
+          </p:nvPr>
+        </p:nvSpPr>
+        <p:spPr/>
+        <p:txBody>
+          <a:bodyPr/>
+          <a:lstStyle/>
+          <a:p>
+            <a:fld id="{31DE2C5B-556E-47B8-A792-024C2FCA4ACC}" type="slidenum">
+              <a:rPr lang="en-GB" smtClean="0"/>
+              <a:t>9</a:t>
+            </a:fld>
+            <a:endParaRPr lang="en-GB"/>
+          </a:p>
+        </p:txBody>
+      </p:sp>
     </p:spTree>
     <p:extLst>
       <p:ext uri="{BB962C8B-B14F-4D97-AF65-F5344CB8AC3E}">

</xml_diff>

<commit_message>
[master] fixed lesson 5
</commit_message>
<xml_diff>
--- a/lab_04-hello-flutter/lab_04-hello_flutter.pptx
+++ b/lab_04-hello-flutter/lab_04-hello_flutter.pptx
@@ -248,7 +248,7 @@
           <a:p>
             <a:fld id="{81C4B3FE-0320-8142-8396-5C3025C019EC}" type="datetimeFigureOut">
               <a:rPr lang="en-IT" smtClean="0"/>
-              <a:t>19/03/22</a:t>
+              <a:t>22/03/22</a:t>
             </a:fld>
             <a:endParaRPr lang="en-IT"/>
           </a:p>
@@ -26305,47 +26305,6 @@
           </a:p>
         </p:txBody>
       </p:sp>
-      <p:cxnSp>
-        <p:nvCxnSpPr>
-          <p:cNvPr id="13" name="Straight Arrow Connector 12">
-            <a:extLst>
-              <a:ext uri="{FF2B5EF4-FFF2-40B4-BE49-F238E27FC236}">
-                <a16:creationId xmlns:a16="http://schemas.microsoft.com/office/drawing/2014/main" id="{0B487A1B-624D-274A-9363-B0C974790162}"/>
-              </a:ext>
-            </a:extLst>
-          </p:cNvPr>
-          <p:cNvCxnSpPr>
-            <a:cxnSpLocks/>
-          </p:cNvCxnSpPr>
-          <p:nvPr/>
-        </p:nvCxnSpPr>
-        <p:spPr>
-          <a:xfrm flipH="1">
-            <a:off x="2891118" y="3254188"/>
-            <a:ext cx="5244353" cy="1"/>
-          </a:xfrm>
-          <a:prstGeom prst="straightConnector1">
-            <a:avLst/>
-          </a:prstGeom>
-          <a:ln>
-            <a:tailEnd type="triangle"/>
-          </a:ln>
-        </p:spPr>
-        <p:style>
-          <a:lnRef idx="1">
-            <a:schemeClr val="accent6"/>
-          </a:lnRef>
-          <a:fillRef idx="0">
-            <a:schemeClr val="accent6"/>
-          </a:fillRef>
-          <a:effectRef idx="0">
-            <a:schemeClr val="accent6"/>
-          </a:effectRef>
-          <a:fontRef idx="minor">
-            <a:schemeClr val="tx1"/>
-          </a:fontRef>
-        </p:style>
-      </p:cxnSp>
       <p:sp>
         <p:nvSpPr>
           <p:cNvPr id="5" name="Slide Number Placeholder 4">
@@ -27770,11 +27729,13 @@
               <a:rPr lang="en-GB" dirty="0">
                 <a:hlinkClick r:id="rId4"/>
               </a:rPr>
-              <a:t>https://docs.flutter.dev/development/tools/devtools/overview</a:t>
-            </a:r>
-            <a:r>
-              <a:rPr lang="en-GB" dirty="0"/>
-              <a:t> ∂</a:t>
+              <a:t>https://docs.flutter.dev/development/tools/devtools</a:t>
+            </a:r>
+            <a:r>
+              <a:rPr lang="en-GB">
+                <a:hlinkClick r:id="rId4"/>
+              </a:rPr>
+              <a:t>/overview</a:t>
             </a:r>
             <a:endParaRPr lang="en-IT" dirty="0"/>
           </a:p>

</xml_diff>